<commit_message>
code changes for bookmark
</commit_message>
<xml_diff>
--- a/Insert_Bookmark_In_PowerPoint/PPTFolder/blankPPTForBookmark.pptx
+++ b/Insert_Bookmark_In_PowerPoint/PPTFolder/blankPPTForBookmark.pptx
@@ -3426,6 +3426,21 @@
           <a:prstGeom prst="rect"/>
         </p:spPr>
       </p:sp>
+      <a:sp>
+        <a:nvSpPr>
+          <a:cNvPr id="6" name="MyBookmark"/>
+          <a:cNvSpPr/>
+          <cdr14:nvPr xmlns:cdr14="http://schemas.microsoft.com/office/drawing/2010/chartDrawing"/>
+        </a:nvSpPr>
+        <a:spPr>
+          <a:xfrm>
+            <a:off x="200000" y="200000"/>
+          </a:xfrm>
+          <a:prstGeom prst="rect"/>
+          <a:noFill/>
+          <wp:inline xmlns:wp="http://schemas.openxmlformats.org/drawingml/2006/wordprocessingDrawing"/>
+        </a:spPr>
+      </a:sp>
     </p:spTree>
     <p:extLst>
       <p:ext uri="{BB962C8B-B14F-4D97-AF65-F5344CB8AC3E}">

</xml_diff>

<commit_message>
corrupted excel font styling project added again
</commit_message>
<xml_diff>
--- a/Insert_Bookmark_In_PowerPoint/PPTFolder/blankPPTForBookmark.pptx
+++ b/Insert_Bookmark_In_PowerPoint/PPTFolder/blankPPTForBookmark.pptx
@@ -3331,7 +3331,7 @@
 </file>
 
 <file path=ppt/slides/slide1.xml><?xml version="1.0" encoding="utf-8"?>
-<p:sld xmlns:a16="http://schemas.microsoft.com/office/drawing/2014/main" xmlns:p14="http://schemas.microsoft.com/office/powerpoint/2010/main" xmlns:a="http://schemas.openxmlformats.org/drawingml/2006/main" xmlns:r="http://schemas.openxmlformats.org/officeDocument/2006/relationships" xmlns:p="http://schemas.openxmlformats.org/presentationml/2006/main">
+<p:sld xmlns:cdr14="http://schemas.microsoft.com/office/drawing/2010/chartDrawing" xmlns:wp="http://schemas.openxmlformats.org/drawingml/2006/wordprocessingDrawing" xmlns:a16="http://schemas.microsoft.com/office/drawing/2014/main" xmlns:p14="http://schemas.microsoft.com/office/powerpoint/2010/main" xmlns:a="http://schemas.openxmlformats.org/drawingml/2006/main" xmlns:r="http://schemas.openxmlformats.org/officeDocument/2006/relationships" xmlns:p="http://schemas.openxmlformats.org/presentationml/2006/main">
   <p:cSld>
     <p:spTree>
       <p:nvGrpSpPr>
@@ -3439,6 +3439,36 @@
           <a:prstGeom prst="rect"/>
           <a:noFill/>
           <wp:inline xmlns:wp="http://schemas.openxmlformats.org/drawingml/2006/wordprocessingDrawing"/>
+        </a:spPr>
+      </a:sp>
+      <a:sp>
+        <a:nvSpPr>
+          <a:cNvPr id="7" name="MyBookmark"/>
+          <a:cNvSpPr/>
+          <cdr14:nvPr/>
+        </a:nvSpPr>
+        <a:spPr>
+          <a:xfrm>
+            <a:off x="200000" y="200000"/>
+          </a:xfrm>
+          <a:prstGeom prst="rect"/>
+          <a:noFill/>
+          <wp:inline/>
+        </a:spPr>
+      </a:sp>
+      <a:sp>
+        <a:nvSpPr>
+          <a:cNvPr id="8" name="MyBookmark"/>
+          <a:cNvSpPr/>
+          <cdr14:nvPr/>
+        </a:nvSpPr>
+        <a:spPr>
+          <a:xfrm>
+            <a:off x="200000" y="200000"/>
+          </a:xfrm>
+          <a:prstGeom prst="rect"/>
+          <a:noFill/>
+          <wp:inline/>
         </a:spPr>
       </a:sp>
     </p:spTree>

</xml_diff>